<commit_message>
- Documentation - Tests Project
</commit_message>
<xml_diff>
--- a/documentation/CLASS Modeler - Architecture.pptx
+++ b/documentation/CLASS Modeler - Architecture.pptx
@@ -5,10 +5,11 @@
     <p:sldMasterId id="2147483648" r:id="rId1"/>
   </p:sldMasterIdLst>
   <p:notesMasterIdLst>
-    <p:notesMasterId r:id="rId3"/>
+    <p:notesMasterId r:id="rId4"/>
   </p:notesMasterIdLst>
   <p:sldIdLst>
     <p:sldId id="256" r:id="rId2"/>
+    <p:sldId id="257" r:id="rId3"/>
   </p:sldIdLst>
   <p:sldSz cx="9144000" cy="6858000" type="screen4x3"/>
   <p:notesSz cx="6858000" cy="9144000"/>
@@ -192,7 +193,7 @@
           <a:p>
             <a:fld id="{509A3F4F-0BA0-4B22-9A96-AD8854429484}" type="datetimeFigureOut">
               <a:rPr lang="es-CO" smtClean="0"/>
-              <a:t>31/08/2013</a:t>
+              <a:t>09/09/2013</a:t>
             </a:fld>
             <a:endParaRPr lang="es-CO"/>
           </a:p>
@@ -725,7 +726,7 @@
           <a:p>
             <a:fld id="{C9465191-5304-47B4-B0A3-6FBFCBDFE76C}" type="datetimeFigureOut">
               <a:rPr lang="es-CO" smtClean="0"/>
-              <a:t>31/08/2013</a:t>
+              <a:t>09/09/2013</a:t>
             </a:fld>
             <a:endParaRPr lang="es-CO"/>
           </a:p>
@@ -895,7 +896,7 @@
           <a:p>
             <a:fld id="{C9465191-5304-47B4-B0A3-6FBFCBDFE76C}" type="datetimeFigureOut">
               <a:rPr lang="es-CO" smtClean="0"/>
-              <a:t>31/08/2013</a:t>
+              <a:t>09/09/2013</a:t>
             </a:fld>
             <a:endParaRPr lang="es-CO"/>
           </a:p>
@@ -1075,7 +1076,7 @@
           <a:p>
             <a:fld id="{C9465191-5304-47B4-B0A3-6FBFCBDFE76C}" type="datetimeFigureOut">
               <a:rPr lang="es-CO" smtClean="0"/>
-              <a:t>31/08/2013</a:t>
+              <a:t>09/09/2013</a:t>
             </a:fld>
             <a:endParaRPr lang="es-CO"/>
           </a:p>
@@ -1245,7 +1246,7 @@
           <a:p>
             <a:fld id="{C9465191-5304-47B4-B0A3-6FBFCBDFE76C}" type="datetimeFigureOut">
               <a:rPr lang="es-CO" smtClean="0"/>
-              <a:t>31/08/2013</a:t>
+              <a:t>09/09/2013</a:t>
             </a:fld>
             <a:endParaRPr lang="es-CO"/>
           </a:p>
@@ -1491,7 +1492,7 @@
           <a:p>
             <a:fld id="{C9465191-5304-47B4-B0A3-6FBFCBDFE76C}" type="datetimeFigureOut">
               <a:rPr lang="es-CO" smtClean="0"/>
-              <a:t>31/08/2013</a:t>
+              <a:t>09/09/2013</a:t>
             </a:fld>
             <a:endParaRPr lang="es-CO"/>
           </a:p>
@@ -1779,7 +1780,7 @@
           <a:p>
             <a:fld id="{C9465191-5304-47B4-B0A3-6FBFCBDFE76C}" type="datetimeFigureOut">
               <a:rPr lang="es-CO" smtClean="0"/>
-              <a:t>31/08/2013</a:t>
+              <a:t>09/09/2013</a:t>
             </a:fld>
             <a:endParaRPr lang="es-CO"/>
           </a:p>
@@ -2201,7 +2202,7 @@
           <a:p>
             <a:fld id="{C9465191-5304-47B4-B0A3-6FBFCBDFE76C}" type="datetimeFigureOut">
               <a:rPr lang="es-CO" smtClean="0"/>
-              <a:t>31/08/2013</a:t>
+              <a:t>09/09/2013</a:t>
             </a:fld>
             <a:endParaRPr lang="es-CO"/>
           </a:p>
@@ -2319,7 +2320,7 @@
           <a:p>
             <a:fld id="{C9465191-5304-47B4-B0A3-6FBFCBDFE76C}" type="datetimeFigureOut">
               <a:rPr lang="es-CO" smtClean="0"/>
-              <a:t>31/08/2013</a:t>
+              <a:t>09/09/2013</a:t>
             </a:fld>
             <a:endParaRPr lang="es-CO"/>
           </a:p>
@@ -2414,7 +2415,7 @@
           <a:p>
             <a:fld id="{C9465191-5304-47B4-B0A3-6FBFCBDFE76C}" type="datetimeFigureOut">
               <a:rPr lang="es-CO" smtClean="0"/>
-              <a:t>31/08/2013</a:t>
+              <a:t>09/09/2013</a:t>
             </a:fld>
             <a:endParaRPr lang="es-CO"/>
           </a:p>
@@ -2691,7 +2692,7 @@
           <a:p>
             <a:fld id="{C9465191-5304-47B4-B0A3-6FBFCBDFE76C}" type="datetimeFigureOut">
               <a:rPr lang="es-CO" smtClean="0"/>
-              <a:t>31/08/2013</a:t>
+              <a:t>09/09/2013</a:t>
             </a:fld>
             <a:endParaRPr lang="es-CO"/>
           </a:p>
@@ -2944,7 +2945,7 @@
           <a:p>
             <a:fld id="{C9465191-5304-47B4-B0A3-6FBFCBDFE76C}" type="datetimeFigureOut">
               <a:rPr lang="es-CO" smtClean="0"/>
-              <a:t>31/08/2013</a:t>
+              <a:t>09/09/2013</a:t>
             </a:fld>
             <a:endParaRPr lang="es-CO"/>
           </a:p>
@@ -3157,7 +3158,7 @@
           <a:p>
             <a:fld id="{C9465191-5304-47B4-B0A3-6FBFCBDFE76C}" type="datetimeFigureOut">
               <a:rPr lang="es-CO" smtClean="0"/>
-              <a:t>31/08/2013</a:t>
+              <a:t>09/09/2013</a:t>
             </a:fld>
             <a:endParaRPr lang="es-CO"/>
           </a:p>
@@ -3713,11 +3714,7 @@
               <a:p>
                 <a:r>
                   <a:rPr lang="es-MX" dirty="0" smtClean="0"/>
-                  <a:t>Cliente </a:t>
-                </a:r>
-                <a:r>
-                  <a:rPr lang="es-MX" dirty="0" smtClean="0"/>
-                  <a:t>(Navegador Web)</a:t>
+                  <a:t>Cliente (Navegador Web)</a:t>
                 </a:r>
                 <a:endParaRPr lang="es-CO" dirty="0"/>
               </a:p>
@@ -5040,6 +5037,36 @@
 </p:sld>
 </file>
 
+<file path=ppt/slides/slide2.xml><?xml version="1.0" encoding="utf-8"?>
+<p:sld xmlns:a="http://schemas.openxmlformats.org/drawingml/2006/main" xmlns:r="http://schemas.openxmlformats.org/officeDocument/2006/relationships" xmlns:p="http://schemas.openxmlformats.org/presentationml/2006/main">
+  <p:cSld>
+    <p:spTree>
+      <p:nvGrpSpPr>
+        <p:cNvPr id="1" name=""/>
+        <p:cNvGrpSpPr/>
+        <p:nvPr/>
+      </p:nvGrpSpPr>
+      <p:grpSpPr>
+        <a:xfrm>
+          <a:off x="0" y="0"/>
+          <a:ext cx="0" cy="0"/>
+          <a:chOff x="0" y="0"/>
+          <a:chExt cx="0" cy="0"/>
+        </a:xfrm>
+      </p:grpSpPr>
+    </p:spTree>
+    <p:extLst>
+      <p:ext uri="{BB962C8B-B14F-4D97-AF65-F5344CB8AC3E}">
+        <p14:creationId xmlns:p14="http://schemas.microsoft.com/office/powerpoint/2010/main" val="3685214909"/>
+      </p:ext>
+    </p:extLst>
+  </p:cSld>
+  <p:clrMapOvr>
+    <a:masterClrMapping/>
+  </p:clrMapOvr>
+</p:sld>
+</file>
+
 <file path=ppt/theme/theme1.xml><?xml version="1.0" encoding="utf-8"?>
 <a:theme xmlns:a="http://schemas.openxmlformats.org/drawingml/2006/main" name="Tema de Office">
   <a:themeElements>

</xml_diff>

<commit_message>
Documentation and Some code improvements.
</commit_message>
<xml_diff>
--- a/documentation/CLASS Modeler - Architecture.pptx
+++ b/documentation/CLASS Modeler - Architecture.pptx
@@ -3609,62 +3609,100 @@
           </a:p>
         </p:txBody>
       </p:sp>
+      <p:sp>
+        <p:nvSpPr>
+          <p:cNvPr id="6" name="5 Cilindro"/>
+          <p:cNvSpPr/>
+          <p:nvPr/>
+        </p:nvSpPr>
+        <p:spPr>
+          <a:xfrm>
+            <a:off x="3707904" y="6525344"/>
+            <a:ext cx="1584176" cy="648072"/>
+          </a:xfrm>
+          <a:prstGeom prst="can">
+            <a:avLst/>
+          </a:prstGeom>
+        </p:spPr>
+        <p:style>
+          <a:lnRef idx="1">
+            <a:schemeClr val="accent1"/>
+          </a:lnRef>
+          <a:fillRef idx="3">
+            <a:schemeClr val="accent1"/>
+          </a:fillRef>
+          <a:effectRef idx="2">
+            <a:schemeClr val="accent1"/>
+          </a:effectRef>
+          <a:fontRef idx="minor">
+            <a:schemeClr val="lt1"/>
+          </a:fontRef>
+        </p:style>
+        <p:txBody>
+          <a:bodyPr rtlCol="0" anchor="ctr"/>
+          <a:lstStyle/>
+          <a:p>
+            <a:pPr algn="ctr"/>
+            <a:r>
+              <a:rPr lang="es-MX" dirty="0" smtClean="0"/>
+              <a:t>Datos</a:t>
+            </a:r>
+            <a:endParaRPr lang="es-CO" dirty="0"/>
+          </a:p>
+        </p:txBody>
+      </p:sp>
+      <p:cxnSp>
+        <p:nvCxnSpPr>
+          <p:cNvPr id="26" name="25 Conector recto"/>
+          <p:cNvCxnSpPr/>
+          <p:nvPr/>
+        </p:nvCxnSpPr>
+        <p:spPr>
+          <a:xfrm>
+            <a:off x="1785843" y="5373216"/>
+            <a:ext cx="5522461" cy="0"/>
+          </a:xfrm>
+          <a:prstGeom prst="line">
+            <a:avLst/>
+          </a:prstGeom>
+          <a:ln w="19050">
+            <a:solidFill>
+              <a:schemeClr val="accent1">
+                <a:lumMod val="50000"/>
+              </a:schemeClr>
+            </a:solidFill>
+            <a:prstDash val="sysDash"/>
+          </a:ln>
+        </p:spPr>
+        <p:style>
+          <a:lnRef idx="1">
+            <a:schemeClr val="accent1"/>
+          </a:lnRef>
+          <a:fillRef idx="0">
+            <a:schemeClr val="accent1"/>
+          </a:fillRef>
+          <a:effectRef idx="0">
+            <a:schemeClr val="accent1"/>
+          </a:effectRef>
+          <a:fontRef idx="minor">
+            <a:schemeClr val="tx1"/>
+          </a:fontRef>
+        </p:style>
+      </p:cxnSp>
       <p:grpSp>
         <p:nvGrpSpPr>
-          <p:cNvPr id="62" name="61 Grupo"/>
+          <p:cNvPr id="13" name="12 Grupo"/>
           <p:cNvGrpSpPr/>
           <p:nvPr/>
         </p:nvGrpSpPr>
         <p:grpSpPr>
           <a:xfrm>
             <a:off x="801912" y="0"/>
-            <a:ext cx="7370488" cy="7173416"/>
+            <a:ext cx="7370488" cy="6458936"/>
             <a:chOff x="801912" y="0"/>
-            <a:chExt cx="7370488" cy="7173416"/>
+            <a:chExt cx="7370488" cy="6458936"/>
           </a:xfrm>
         </p:grpSpPr>
-        <p:sp>
-          <p:nvSpPr>
-            <p:cNvPr id="6" name="5 Cilindro"/>
-            <p:cNvSpPr/>
-            <p:nvPr/>
-          </p:nvSpPr>
-          <p:spPr>
-            <a:xfrm>
-              <a:off x="3707904" y="6525344"/>
-              <a:ext cx="1584176" cy="648072"/>
-            </a:xfrm>
-            <a:prstGeom prst="can">
-              <a:avLst/>
-            </a:prstGeom>
-          </p:spPr>
-          <p:style>
-            <a:lnRef idx="1">
-              <a:schemeClr val="accent1"/>
-            </a:lnRef>
-            <a:fillRef idx="3">
-              <a:schemeClr val="accent1"/>
-            </a:fillRef>
-            <a:effectRef idx="2">
-              <a:schemeClr val="accent1"/>
-            </a:effectRef>
-            <a:fontRef idx="minor">
-              <a:schemeClr val="lt1"/>
-            </a:fontRef>
-          </p:style>
-          <p:txBody>
-            <a:bodyPr rtlCol="0" anchor="ctr"/>
-            <a:lstStyle/>
-            <a:p>
-              <a:pPr algn="ctr"/>
-              <a:r>
-                <a:rPr lang="es-MX" dirty="0" smtClean="0"/>
-                <a:t>Datos</a:t>
-              </a:r>
-              <a:endParaRPr lang="es-CO" dirty="0"/>
-            </a:p>
-          </p:txBody>
-        </p:sp>
         <p:grpSp>
           <p:nvGrpSpPr>
             <p:cNvPr id="3" name="2 Grupo"/>
@@ -4040,7 +4078,7 @@
         </p:grpSp>
         <p:grpSp>
           <p:nvGrpSpPr>
-            <p:cNvPr id="61" name="60 Grupo"/>
+            <p:cNvPr id="12" name="11 Grupo"/>
             <p:cNvGrpSpPr/>
             <p:nvPr/>
           </p:nvGrpSpPr>
@@ -4170,391 +4208,6 @@
               </a:p>
             </p:txBody>
           </p:sp>
-          <p:grpSp>
-            <p:nvGrpSpPr>
-              <p:cNvPr id="25" name="24 Grupo"/>
-              <p:cNvGrpSpPr/>
-              <p:nvPr/>
-            </p:nvGrpSpPr>
-            <p:grpSpPr>
-              <a:xfrm>
-                <a:off x="1547664" y="3671223"/>
-                <a:ext cx="5832648" cy="2638097"/>
-                <a:chOff x="1979712" y="3671223"/>
-                <a:chExt cx="5832648" cy="2638097"/>
-              </a:xfrm>
-            </p:grpSpPr>
-            <p:sp>
-              <p:nvSpPr>
-                <p:cNvPr id="9" name="8 Rectángulo"/>
-                <p:cNvSpPr/>
-                <p:nvPr/>
-              </p:nvSpPr>
-              <p:spPr>
-                <a:xfrm>
-                  <a:off x="1979712" y="3671223"/>
-                  <a:ext cx="5832648" cy="2638097"/>
-                </a:xfrm>
-                <a:prstGeom prst="rect">
-                  <a:avLst/>
-                </a:prstGeom>
-              </p:spPr>
-              <p:style>
-                <a:lnRef idx="1">
-                  <a:schemeClr val="accent2"/>
-                </a:lnRef>
-                <a:fillRef idx="3">
-                  <a:schemeClr val="accent2"/>
-                </a:fillRef>
-                <a:effectRef idx="2">
-                  <a:schemeClr val="accent2"/>
-                </a:effectRef>
-                <a:fontRef idx="minor">
-                  <a:schemeClr val="lt1"/>
-                </a:fontRef>
-              </p:style>
-              <p:txBody>
-                <a:bodyPr rtlCol="0" anchor="ctr"/>
-                <a:lstStyle/>
-                <a:p>
-                  <a:pPr algn="ctr"/>
-                  <a:endParaRPr lang="es-CO"/>
-                </a:p>
-              </p:txBody>
-            </p:sp>
-            <p:grpSp>
-              <p:nvGrpSpPr>
-                <p:cNvPr id="40" name="39 Grupo"/>
-                <p:cNvGrpSpPr/>
-                <p:nvPr/>
-              </p:nvGrpSpPr>
-              <p:grpSpPr>
-                <a:xfrm>
-                  <a:off x="3304191" y="5589240"/>
-                  <a:ext cx="3284033" cy="504056"/>
-                  <a:chOff x="3304191" y="5228689"/>
-                  <a:chExt cx="3284033" cy="504056"/>
-                </a:xfrm>
-              </p:grpSpPr>
-              <p:sp>
-                <p:nvSpPr>
-                  <p:cNvPr id="29" name="28 Rectángulo"/>
-                  <p:cNvSpPr/>
-                  <p:nvPr/>
-                </p:nvSpPr>
-                <p:spPr>
-                  <a:xfrm>
-                    <a:off x="3304191" y="5228689"/>
-                    <a:ext cx="1314146" cy="504056"/>
-                  </a:xfrm>
-                  <a:prstGeom prst="rect">
-                    <a:avLst/>
-                  </a:prstGeom>
-                </p:spPr>
-                <p:style>
-                  <a:lnRef idx="1">
-                    <a:schemeClr val="accent5"/>
-                  </a:lnRef>
-                  <a:fillRef idx="3">
-                    <a:schemeClr val="accent5"/>
-                  </a:fillRef>
-                  <a:effectRef idx="2">
-                    <a:schemeClr val="accent5"/>
-                  </a:effectRef>
-                  <a:fontRef idx="minor">
-                    <a:schemeClr val="lt1"/>
-                  </a:fontRef>
-                </p:style>
-                <p:txBody>
-                  <a:bodyPr rtlCol="0" anchor="ctr"/>
-                  <a:lstStyle/>
-                  <a:p>
-                    <a:pPr algn="ctr"/>
-                    <a:r>
-                      <a:rPr lang="es-MX" dirty="0" smtClean="0"/>
-                      <a:t>JPA</a:t>
-                    </a:r>
-                    <a:endParaRPr lang="es-CO" dirty="0"/>
-                  </a:p>
-                </p:txBody>
-              </p:sp>
-              <p:sp>
-                <p:nvSpPr>
-                  <p:cNvPr id="30" name="29 Rectángulo"/>
-                  <p:cNvSpPr/>
-                  <p:nvPr/>
-                </p:nvSpPr>
-                <p:spPr>
-                  <a:xfrm>
-                    <a:off x="5184068" y="5228689"/>
-                    <a:ext cx="1404156" cy="504056"/>
-                  </a:xfrm>
-                  <a:prstGeom prst="rect">
-                    <a:avLst/>
-                  </a:prstGeom>
-                </p:spPr>
-                <p:style>
-                  <a:lnRef idx="1">
-                    <a:schemeClr val="accent5"/>
-                  </a:lnRef>
-                  <a:fillRef idx="3">
-                    <a:schemeClr val="accent5"/>
-                  </a:fillRef>
-                  <a:effectRef idx="2">
-                    <a:schemeClr val="accent5"/>
-                  </a:effectRef>
-                  <a:fontRef idx="minor">
-                    <a:schemeClr val="lt1"/>
-                  </a:fontRef>
-                </p:style>
-                <p:txBody>
-                  <a:bodyPr rtlCol="0" anchor="ctr"/>
-                  <a:lstStyle/>
-                  <a:p>
-                    <a:pPr algn="ctr"/>
-                    <a:r>
-                      <a:rPr lang="es-MX" dirty="0" smtClean="0"/>
-                      <a:t>JDBC</a:t>
-                    </a:r>
-                    <a:endParaRPr lang="es-CO" dirty="0"/>
-                  </a:p>
-                </p:txBody>
-              </p:sp>
-            </p:grpSp>
-            <p:grpSp>
-              <p:nvGrpSpPr>
-                <p:cNvPr id="39" name="38 Grupo"/>
-                <p:cNvGrpSpPr/>
-                <p:nvPr/>
-              </p:nvGrpSpPr>
-              <p:grpSpPr>
-                <a:xfrm>
-                  <a:off x="2397460" y="3884876"/>
-                  <a:ext cx="5184576" cy="1357325"/>
-                  <a:chOff x="2397460" y="3596333"/>
-                  <a:chExt cx="5184576" cy="1357325"/>
-                </a:xfrm>
-              </p:grpSpPr>
-              <p:sp>
-                <p:nvSpPr>
-                  <p:cNvPr id="31" name="30 Rectángulo"/>
-                  <p:cNvSpPr/>
-                  <p:nvPr/>
-                </p:nvSpPr>
-                <p:spPr>
-                  <a:xfrm>
-                    <a:off x="2397460" y="3601294"/>
-                    <a:ext cx="1641884" cy="375743"/>
-                  </a:xfrm>
-                  <a:prstGeom prst="rect">
-                    <a:avLst/>
-                  </a:prstGeom>
-                </p:spPr>
-                <p:style>
-                  <a:lnRef idx="1">
-                    <a:schemeClr val="accent5"/>
-                  </a:lnRef>
-                  <a:fillRef idx="3">
-                    <a:schemeClr val="accent5"/>
-                  </a:fillRef>
-                  <a:effectRef idx="2">
-                    <a:schemeClr val="accent5"/>
-                  </a:effectRef>
-                  <a:fontRef idx="minor">
-                    <a:schemeClr val="lt1"/>
-                  </a:fontRef>
-                </p:style>
-                <p:txBody>
-                  <a:bodyPr rtlCol="0" anchor="ctr"/>
-                  <a:lstStyle/>
-                  <a:p>
-                    <a:pPr algn="ctr"/>
-                    <a:r>
-                      <a:rPr lang="es-MX" sz="1600" dirty="0" err="1" smtClean="0"/>
-                      <a:t>JavaMail</a:t>
-                    </a:r>
-                    <a:endParaRPr lang="es-CO" sz="1600" dirty="0"/>
-                  </a:p>
-                </p:txBody>
-              </p:sp>
-              <p:sp>
-                <p:nvSpPr>
-                  <p:cNvPr id="32" name="31 Rectángulo"/>
-                  <p:cNvSpPr/>
-                  <p:nvPr/>
-                </p:nvSpPr>
-                <p:spPr>
-                  <a:xfrm>
-                    <a:off x="2397460" y="4091929"/>
-                    <a:ext cx="5184576" cy="861729"/>
-                  </a:xfrm>
-                  <a:prstGeom prst="rect">
-                    <a:avLst/>
-                  </a:prstGeom>
-                </p:spPr>
-                <p:style>
-                  <a:lnRef idx="1">
-                    <a:schemeClr val="accent6"/>
-                  </a:lnRef>
-                  <a:fillRef idx="3">
-                    <a:schemeClr val="accent6"/>
-                  </a:fillRef>
-                  <a:effectRef idx="2">
-                    <a:schemeClr val="accent6"/>
-                  </a:effectRef>
-                  <a:fontRef idx="minor">
-                    <a:schemeClr val="lt1"/>
-                  </a:fontRef>
-                </p:style>
-                <p:txBody>
-                  <a:bodyPr rtlCol="0" anchor="ctr"/>
-                  <a:lstStyle/>
-                  <a:p>
-                    <a:pPr algn="ctr"/>
-                    <a:r>
-                      <a:rPr lang="es-MX" dirty="0" smtClean="0"/>
-                      <a:t>Enterprise Java </a:t>
-                    </a:r>
-                    <a:r>
-                      <a:rPr lang="es-MX" dirty="0" err="1" smtClean="0"/>
-                      <a:t>Beans</a:t>
-                    </a:r>
-                    <a:endParaRPr lang="es-CO" dirty="0"/>
-                  </a:p>
-                </p:txBody>
-              </p:sp>
-              <p:sp>
-                <p:nvSpPr>
-                  <p:cNvPr id="33" name="32 Rectángulo"/>
-                  <p:cNvSpPr/>
-                  <p:nvPr/>
-                </p:nvSpPr>
-                <p:spPr>
-                  <a:xfrm>
-                    <a:off x="5940152" y="3601294"/>
-                    <a:ext cx="1641884" cy="385663"/>
-                  </a:xfrm>
-                  <a:prstGeom prst="rect">
-                    <a:avLst/>
-                  </a:prstGeom>
-                </p:spPr>
-                <p:style>
-                  <a:lnRef idx="1">
-                    <a:schemeClr val="accent5"/>
-                  </a:lnRef>
-                  <a:fillRef idx="3">
-                    <a:schemeClr val="accent5"/>
-                  </a:fillRef>
-                  <a:effectRef idx="2">
-                    <a:schemeClr val="accent5"/>
-                  </a:effectRef>
-                  <a:fontRef idx="minor">
-                    <a:schemeClr val="lt1"/>
-                  </a:fontRef>
-                </p:style>
-                <p:txBody>
-                  <a:bodyPr rtlCol="0" anchor="ctr"/>
-                  <a:lstStyle/>
-                  <a:p>
-                    <a:pPr algn="ctr"/>
-                    <a:r>
-                      <a:rPr lang="es-MX" sz="1600" dirty="0" smtClean="0"/>
-                      <a:t>Eclipse UML2</a:t>
-                    </a:r>
-                    <a:endParaRPr lang="es-CO" sz="1600" dirty="0"/>
-                  </a:p>
-                </p:txBody>
-              </p:sp>
-              <p:sp>
-                <p:nvSpPr>
-                  <p:cNvPr id="34" name="33 Rectángulo"/>
-                  <p:cNvSpPr/>
-                  <p:nvPr/>
-                </p:nvSpPr>
-                <p:spPr>
-                  <a:xfrm>
-                    <a:off x="4168984" y="3596333"/>
-                    <a:ext cx="1641884" cy="385663"/>
-                  </a:xfrm>
-                  <a:prstGeom prst="rect">
-                    <a:avLst/>
-                  </a:prstGeom>
-                </p:spPr>
-                <p:style>
-                  <a:lnRef idx="1">
-                    <a:schemeClr val="accent5"/>
-                  </a:lnRef>
-                  <a:fillRef idx="3">
-                    <a:schemeClr val="accent5"/>
-                  </a:fillRef>
-                  <a:effectRef idx="2">
-                    <a:schemeClr val="accent5"/>
-                  </a:effectRef>
-                  <a:fontRef idx="minor">
-                    <a:schemeClr val="lt1"/>
-                  </a:fontRef>
-                </p:style>
-                <p:txBody>
-                  <a:bodyPr rtlCol="0" anchor="ctr"/>
-                  <a:lstStyle/>
-                  <a:p>
-                    <a:pPr algn="ctr"/>
-                    <a:r>
-                      <a:rPr lang="es-MX" sz="1600" dirty="0" err="1" smtClean="0"/>
-                      <a:t>mxGraph</a:t>
-                    </a:r>
-                    <a:r>
-                      <a:rPr lang="es-MX" sz="1600" dirty="0" smtClean="0"/>
-                      <a:t> </a:t>
-                    </a:r>
-                    <a:r>
-                      <a:rPr lang="es-MX" sz="1600" dirty="0" err="1" smtClean="0"/>
-                      <a:t>Core</a:t>
-                    </a:r>
-                    <a:endParaRPr lang="es-CO" sz="1600" dirty="0"/>
-                  </a:p>
-                </p:txBody>
-              </p:sp>
-            </p:grpSp>
-            <p:cxnSp>
-              <p:nvCxnSpPr>
-                <p:cNvPr id="26" name="25 Conector recto"/>
-                <p:cNvCxnSpPr/>
-                <p:nvPr/>
-              </p:nvCxnSpPr>
-              <p:spPr>
-                <a:xfrm>
-                  <a:off x="2217891" y="5373216"/>
-                  <a:ext cx="5522461" cy="0"/>
-                </a:xfrm>
-                <a:prstGeom prst="line">
-                  <a:avLst/>
-                </a:prstGeom>
-                <a:ln w="19050">
-                  <a:solidFill>
-                    <a:schemeClr val="accent1">
-                      <a:lumMod val="50000"/>
-                    </a:schemeClr>
-                  </a:solidFill>
-                  <a:prstDash val="sysDash"/>
-                </a:ln>
-              </p:spPr>
-              <p:style>
-                <a:lnRef idx="1">
-                  <a:schemeClr val="accent1"/>
-                </a:lnRef>
-                <a:fillRef idx="0">
-                  <a:schemeClr val="accent1"/>
-                </a:fillRef>
-                <a:effectRef idx="0">
-                  <a:schemeClr val="accent1"/>
-                </a:effectRef>
-                <a:fontRef idx="minor">
-                  <a:schemeClr val="tx1"/>
-                </a:fontRef>
-              </p:style>
-            </p:cxnSp>
-          </p:grpSp>
           <p:grpSp>
             <p:nvGrpSpPr>
               <p:cNvPr id="58" name="57 Grupo"/>
@@ -5022,6 +4675,429 @@
               </p:sp>
             </p:grpSp>
           </p:grpSp>
+          <p:grpSp>
+            <p:nvGrpSpPr>
+              <p:cNvPr id="7" name="6 Grupo"/>
+              <p:cNvGrpSpPr/>
+              <p:nvPr/>
+            </p:nvGrpSpPr>
+            <p:grpSpPr>
+              <a:xfrm>
+                <a:off x="1547664" y="3671223"/>
+                <a:ext cx="5832648" cy="2696664"/>
+                <a:chOff x="1547664" y="3671223"/>
+                <a:chExt cx="5832648" cy="2696664"/>
+              </a:xfrm>
+            </p:grpSpPr>
+            <p:sp>
+              <p:nvSpPr>
+                <p:cNvPr id="9" name="8 Rectángulo"/>
+                <p:cNvSpPr/>
+                <p:nvPr/>
+              </p:nvSpPr>
+              <p:spPr>
+                <a:xfrm>
+                  <a:off x="1547664" y="3671223"/>
+                  <a:ext cx="5832648" cy="2638097"/>
+                </a:xfrm>
+                <a:prstGeom prst="rect">
+                  <a:avLst/>
+                </a:prstGeom>
+              </p:spPr>
+              <p:style>
+                <a:lnRef idx="1">
+                  <a:schemeClr val="accent2"/>
+                </a:lnRef>
+                <a:fillRef idx="3">
+                  <a:schemeClr val="accent2"/>
+                </a:fillRef>
+                <a:effectRef idx="2">
+                  <a:schemeClr val="accent2"/>
+                </a:effectRef>
+                <a:fontRef idx="minor">
+                  <a:schemeClr val="lt1"/>
+                </a:fontRef>
+              </p:style>
+              <p:txBody>
+                <a:bodyPr rtlCol="0" anchor="ctr"/>
+                <a:lstStyle/>
+                <a:p>
+                  <a:pPr algn="ctr"/>
+                  <a:endParaRPr lang="es-CO"/>
+                </a:p>
+              </p:txBody>
+            </p:sp>
+            <p:grpSp>
+              <p:nvGrpSpPr>
+                <p:cNvPr id="40" name="39 Grupo"/>
+                <p:cNvGrpSpPr/>
+                <p:nvPr/>
+              </p:nvGrpSpPr>
+              <p:grpSpPr>
+                <a:xfrm>
+                  <a:off x="2872143" y="5589240"/>
+                  <a:ext cx="3284033" cy="504056"/>
+                  <a:chOff x="3304191" y="5228689"/>
+                  <a:chExt cx="3284033" cy="504056"/>
+                </a:xfrm>
+              </p:grpSpPr>
+              <p:sp>
+                <p:nvSpPr>
+                  <p:cNvPr id="29" name="28 Rectángulo"/>
+                  <p:cNvSpPr/>
+                  <p:nvPr/>
+                </p:nvSpPr>
+                <p:spPr>
+                  <a:xfrm>
+                    <a:off x="3304191" y="5228689"/>
+                    <a:ext cx="1314146" cy="504056"/>
+                  </a:xfrm>
+                  <a:prstGeom prst="rect">
+                    <a:avLst/>
+                  </a:prstGeom>
+                </p:spPr>
+                <p:style>
+                  <a:lnRef idx="1">
+                    <a:schemeClr val="accent5"/>
+                  </a:lnRef>
+                  <a:fillRef idx="3">
+                    <a:schemeClr val="accent5"/>
+                  </a:fillRef>
+                  <a:effectRef idx="2">
+                    <a:schemeClr val="accent5"/>
+                  </a:effectRef>
+                  <a:fontRef idx="minor">
+                    <a:schemeClr val="lt1"/>
+                  </a:fontRef>
+                </p:style>
+                <p:txBody>
+                  <a:bodyPr rtlCol="0" anchor="ctr"/>
+                  <a:lstStyle/>
+                  <a:p>
+                    <a:pPr algn="ctr"/>
+                    <a:r>
+                      <a:rPr lang="es-MX" dirty="0" smtClean="0"/>
+                      <a:t>JPA</a:t>
+                    </a:r>
+                    <a:endParaRPr lang="es-CO" dirty="0"/>
+                  </a:p>
+                </p:txBody>
+              </p:sp>
+              <p:sp>
+                <p:nvSpPr>
+                  <p:cNvPr id="30" name="29 Rectángulo"/>
+                  <p:cNvSpPr/>
+                  <p:nvPr/>
+                </p:nvSpPr>
+                <p:spPr>
+                  <a:xfrm>
+                    <a:off x="5184068" y="5228689"/>
+                    <a:ext cx="1404156" cy="504056"/>
+                  </a:xfrm>
+                  <a:prstGeom prst="rect">
+                    <a:avLst/>
+                  </a:prstGeom>
+                </p:spPr>
+                <p:style>
+                  <a:lnRef idx="1">
+                    <a:schemeClr val="accent5"/>
+                  </a:lnRef>
+                  <a:fillRef idx="3">
+                    <a:schemeClr val="accent5"/>
+                  </a:fillRef>
+                  <a:effectRef idx="2">
+                    <a:schemeClr val="accent5"/>
+                  </a:effectRef>
+                  <a:fontRef idx="minor">
+                    <a:schemeClr val="lt1"/>
+                  </a:fontRef>
+                </p:style>
+                <p:txBody>
+                  <a:bodyPr rtlCol="0" anchor="ctr"/>
+                  <a:lstStyle/>
+                  <a:p>
+                    <a:pPr algn="ctr"/>
+                    <a:r>
+                      <a:rPr lang="es-MX" dirty="0" smtClean="0"/>
+                      <a:t>JDBC</a:t>
+                    </a:r>
+                    <a:endParaRPr lang="es-CO" dirty="0"/>
+                  </a:p>
+                </p:txBody>
+              </p:sp>
+            </p:grpSp>
+            <p:grpSp>
+              <p:nvGrpSpPr>
+                <p:cNvPr id="39" name="38 Grupo"/>
+                <p:cNvGrpSpPr/>
+                <p:nvPr/>
+              </p:nvGrpSpPr>
+              <p:grpSpPr>
+                <a:xfrm>
+                  <a:off x="1965412" y="3884876"/>
+                  <a:ext cx="5184576" cy="1357325"/>
+                  <a:chOff x="2397460" y="3596333"/>
+                  <a:chExt cx="5184576" cy="1357325"/>
+                </a:xfrm>
+              </p:grpSpPr>
+              <p:sp>
+                <p:nvSpPr>
+                  <p:cNvPr id="31" name="30 Rectángulo"/>
+                  <p:cNvSpPr/>
+                  <p:nvPr/>
+                </p:nvSpPr>
+                <p:spPr>
+                  <a:xfrm>
+                    <a:off x="2397460" y="3601294"/>
+                    <a:ext cx="1641884" cy="375743"/>
+                  </a:xfrm>
+                  <a:prstGeom prst="rect">
+                    <a:avLst/>
+                  </a:prstGeom>
+                </p:spPr>
+                <p:style>
+                  <a:lnRef idx="1">
+                    <a:schemeClr val="accent5"/>
+                  </a:lnRef>
+                  <a:fillRef idx="3">
+                    <a:schemeClr val="accent5"/>
+                  </a:fillRef>
+                  <a:effectRef idx="2">
+                    <a:schemeClr val="accent5"/>
+                  </a:effectRef>
+                  <a:fontRef idx="minor">
+                    <a:schemeClr val="lt1"/>
+                  </a:fontRef>
+                </p:style>
+                <p:txBody>
+                  <a:bodyPr rtlCol="0" anchor="ctr"/>
+                  <a:lstStyle/>
+                  <a:p>
+                    <a:pPr algn="ctr"/>
+                    <a:r>
+                      <a:rPr lang="es-MX" sz="1600" dirty="0" err="1" smtClean="0"/>
+                      <a:t>JavaMail</a:t>
+                    </a:r>
+                    <a:endParaRPr lang="es-CO" sz="1600" dirty="0"/>
+                  </a:p>
+                </p:txBody>
+              </p:sp>
+              <p:sp>
+                <p:nvSpPr>
+                  <p:cNvPr id="32" name="31 Rectángulo"/>
+                  <p:cNvSpPr/>
+                  <p:nvPr/>
+                </p:nvSpPr>
+                <p:spPr>
+                  <a:xfrm>
+                    <a:off x="2397460" y="4091929"/>
+                    <a:ext cx="5184576" cy="861729"/>
+                  </a:xfrm>
+                  <a:prstGeom prst="rect">
+                    <a:avLst/>
+                  </a:prstGeom>
+                </p:spPr>
+                <p:style>
+                  <a:lnRef idx="1">
+                    <a:schemeClr val="accent6"/>
+                  </a:lnRef>
+                  <a:fillRef idx="3">
+                    <a:schemeClr val="accent6"/>
+                  </a:fillRef>
+                  <a:effectRef idx="2">
+                    <a:schemeClr val="accent6"/>
+                  </a:effectRef>
+                  <a:fontRef idx="minor">
+                    <a:schemeClr val="lt1"/>
+                  </a:fontRef>
+                </p:style>
+                <p:txBody>
+                  <a:bodyPr rtlCol="0" anchor="ctr"/>
+                  <a:lstStyle/>
+                  <a:p>
+                    <a:pPr algn="ctr"/>
+                    <a:r>
+                      <a:rPr lang="es-MX" dirty="0" smtClean="0"/>
+                      <a:t>Enterprise Java </a:t>
+                    </a:r>
+                    <a:r>
+                      <a:rPr lang="es-MX" dirty="0" err="1" smtClean="0"/>
+                      <a:t>Beans</a:t>
+                    </a:r>
+                    <a:endParaRPr lang="es-CO" dirty="0"/>
+                  </a:p>
+                </p:txBody>
+              </p:sp>
+              <p:sp>
+                <p:nvSpPr>
+                  <p:cNvPr id="33" name="32 Rectángulo"/>
+                  <p:cNvSpPr/>
+                  <p:nvPr/>
+                </p:nvSpPr>
+                <p:spPr>
+                  <a:xfrm>
+                    <a:off x="5940152" y="3601294"/>
+                    <a:ext cx="1641884" cy="385663"/>
+                  </a:xfrm>
+                  <a:prstGeom prst="rect">
+                    <a:avLst/>
+                  </a:prstGeom>
+                </p:spPr>
+                <p:style>
+                  <a:lnRef idx="1">
+                    <a:schemeClr val="accent5"/>
+                  </a:lnRef>
+                  <a:fillRef idx="3">
+                    <a:schemeClr val="accent5"/>
+                  </a:fillRef>
+                  <a:effectRef idx="2">
+                    <a:schemeClr val="accent5"/>
+                  </a:effectRef>
+                  <a:fontRef idx="minor">
+                    <a:schemeClr val="lt1"/>
+                  </a:fontRef>
+                </p:style>
+                <p:txBody>
+                  <a:bodyPr rtlCol="0" anchor="ctr"/>
+                  <a:lstStyle/>
+                  <a:p>
+                    <a:pPr algn="ctr"/>
+                    <a:r>
+                      <a:rPr lang="es-MX" sz="1600" dirty="0" smtClean="0"/>
+                      <a:t>Eclipse UML2</a:t>
+                    </a:r>
+                    <a:endParaRPr lang="es-CO" sz="1600" dirty="0"/>
+                  </a:p>
+                </p:txBody>
+              </p:sp>
+              <p:sp>
+                <p:nvSpPr>
+                  <p:cNvPr id="34" name="33 Rectángulo"/>
+                  <p:cNvSpPr/>
+                  <p:nvPr/>
+                </p:nvSpPr>
+                <p:spPr>
+                  <a:xfrm>
+                    <a:off x="4168984" y="3596333"/>
+                    <a:ext cx="1641884" cy="385663"/>
+                  </a:xfrm>
+                  <a:prstGeom prst="rect">
+                    <a:avLst/>
+                  </a:prstGeom>
+                </p:spPr>
+                <p:style>
+                  <a:lnRef idx="1">
+                    <a:schemeClr val="accent5"/>
+                  </a:lnRef>
+                  <a:fillRef idx="3">
+                    <a:schemeClr val="accent5"/>
+                  </a:fillRef>
+                  <a:effectRef idx="2">
+                    <a:schemeClr val="accent5"/>
+                  </a:effectRef>
+                  <a:fontRef idx="minor">
+                    <a:schemeClr val="lt1"/>
+                  </a:fontRef>
+                </p:style>
+                <p:txBody>
+                  <a:bodyPr rtlCol="0" anchor="ctr"/>
+                  <a:lstStyle/>
+                  <a:p>
+                    <a:pPr algn="ctr"/>
+                    <a:r>
+                      <a:rPr lang="es-MX" sz="1600" dirty="0" err="1" smtClean="0"/>
+                      <a:t>mxGraph</a:t>
+                    </a:r>
+                    <a:r>
+                      <a:rPr lang="es-MX" sz="1600" dirty="0" smtClean="0"/>
+                      <a:t> </a:t>
+                    </a:r>
+                    <a:r>
+                      <a:rPr lang="es-MX" sz="1600" dirty="0" err="1" smtClean="0"/>
+                      <a:t>Core</a:t>
+                    </a:r>
+                    <a:endParaRPr lang="es-CO" sz="1600" dirty="0"/>
+                  </a:p>
+                </p:txBody>
+              </p:sp>
+            </p:grpSp>
+            <p:sp>
+              <p:nvSpPr>
+                <p:cNvPr id="48" name="47 CuadroTexto"/>
+                <p:cNvSpPr txBox="1"/>
+                <p:nvPr/>
+              </p:nvSpPr>
+              <p:spPr>
+                <a:xfrm rot="16200000">
+                  <a:off x="922907" y="4298553"/>
+                  <a:ext cx="1557295" cy="307779"/>
+                </a:xfrm>
+                <a:prstGeom prst="rect">
+                  <a:avLst/>
+                </a:prstGeom>
+                <a:noFill/>
+              </p:spPr>
+              <p:txBody>
+                <a:bodyPr wrap="square" rtlCol="0">
+                  <a:spAutoFit/>
+                </a:bodyPr>
+                <a:lstStyle/>
+                <a:p>
+                  <a:r>
+                    <a:rPr lang="es-MX" sz="1400" dirty="0" smtClean="0">
+                      <a:solidFill>
+                        <a:schemeClr val="bg1"/>
+                      </a:solidFill>
+                    </a:rPr>
+                    <a:t>Lógica de negocio</a:t>
+                  </a:r>
+                  <a:endParaRPr lang="es-CO" sz="1400" dirty="0">
+                    <a:solidFill>
+                      <a:schemeClr val="bg1"/>
+                    </a:solidFill>
+                  </a:endParaRPr>
+                </a:p>
+              </p:txBody>
+            </p:sp>
+            <p:sp>
+              <p:nvSpPr>
+                <p:cNvPr id="52" name="51 CuadroTexto"/>
+                <p:cNvSpPr txBox="1"/>
+                <p:nvPr/>
+              </p:nvSpPr>
+              <p:spPr>
+                <a:xfrm rot="16200000">
+                  <a:off x="1126306" y="5634562"/>
+                  <a:ext cx="1158873" cy="307777"/>
+                </a:xfrm>
+                <a:prstGeom prst="rect">
+                  <a:avLst/>
+                </a:prstGeom>
+                <a:noFill/>
+              </p:spPr>
+              <p:txBody>
+                <a:bodyPr wrap="square" rtlCol="0">
+                  <a:spAutoFit/>
+                </a:bodyPr>
+                <a:lstStyle/>
+                <a:p>
+                  <a:r>
+                    <a:rPr lang="es-MX" sz="1400" dirty="0" smtClean="0">
+                      <a:solidFill>
+                        <a:schemeClr val="bg1"/>
+                      </a:solidFill>
+                    </a:rPr>
+                    <a:t>Presentación</a:t>
+                  </a:r>
+                  <a:endParaRPr lang="es-CO" sz="1400" dirty="0">
+                    <a:solidFill>
+                      <a:schemeClr val="bg1"/>
+                    </a:solidFill>
+                  </a:endParaRPr>
+                </a:p>
+              </p:txBody>
+            </p:sp>
+          </p:grpSp>
         </p:grpSp>
       </p:grpSp>
     </p:spTree>
@@ -5054,6 +5130,191 @@
           <a:chExt cx="0" cy="0"/>
         </a:xfrm>
       </p:grpSpPr>
+      <p:grpSp>
+        <p:nvGrpSpPr>
+          <p:cNvPr id="15" name="14 Grupo"/>
+          <p:cNvGrpSpPr/>
+          <p:nvPr/>
+        </p:nvGrpSpPr>
+        <p:grpSpPr>
+          <a:xfrm>
+            <a:off x="1187624" y="1052736"/>
+            <a:ext cx="6120680" cy="4392488"/>
+            <a:chOff x="1187624" y="1052736"/>
+            <a:chExt cx="6120680" cy="4392488"/>
+          </a:xfrm>
+        </p:grpSpPr>
+        <p:sp>
+          <p:nvSpPr>
+            <p:cNvPr id="2" name="1 Rectángulo redondeado"/>
+            <p:cNvSpPr/>
+            <p:nvPr/>
+          </p:nvSpPr>
+          <p:spPr>
+            <a:xfrm>
+              <a:off x="1187624" y="1052736"/>
+              <a:ext cx="6120680" cy="4392488"/>
+            </a:xfrm>
+            <a:prstGeom prst="roundRect">
+              <a:avLst>
+                <a:gd name="adj" fmla="val 3945"/>
+              </a:avLst>
+            </a:prstGeom>
+          </p:spPr>
+          <p:style>
+            <a:lnRef idx="1">
+              <a:schemeClr val="accent1"/>
+            </a:lnRef>
+            <a:fillRef idx="2">
+              <a:schemeClr val="accent1"/>
+            </a:fillRef>
+            <a:effectRef idx="1">
+              <a:schemeClr val="accent1"/>
+            </a:effectRef>
+            <a:fontRef idx="minor">
+              <a:schemeClr val="dk1"/>
+            </a:fontRef>
+          </p:style>
+          <p:txBody>
+            <a:bodyPr rtlCol="0" anchor="ctr"/>
+            <a:lstStyle/>
+            <a:p>
+              <a:pPr algn="ctr"/>
+              <a:r>
+                <a:rPr lang="es-MX" dirty="0" err="1" smtClean="0"/>
+                <a:t>CLASSModeler</a:t>
+              </a:r>
+              <a:endParaRPr lang="es-CO" dirty="0"/>
+            </a:p>
+          </p:txBody>
+        </p:sp>
+        <p:sp>
+          <p:nvSpPr>
+            <p:cNvPr id="3" name="2 Elipse"/>
+            <p:cNvSpPr/>
+            <p:nvPr/>
+          </p:nvSpPr>
+          <p:spPr>
+            <a:xfrm>
+              <a:off x="1386136" y="1463204"/>
+              <a:ext cx="2681808" cy="1224136"/>
+            </a:xfrm>
+            <a:prstGeom prst="ellipse">
+              <a:avLst/>
+            </a:prstGeom>
+          </p:spPr>
+          <p:style>
+            <a:lnRef idx="1">
+              <a:schemeClr val="accent4"/>
+            </a:lnRef>
+            <a:fillRef idx="2">
+              <a:schemeClr val="accent4"/>
+            </a:fillRef>
+            <a:effectRef idx="1">
+              <a:schemeClr val="accent4"/>
+            </a:effectRef>
+            <a:fontRef idx="minor">
+              <a:schemeClr val="dk1"/>
+            </a:fontRef>
+          </p:style>
+          <p:txBody>
+            <a:bodyPr rtlCol="0" anchor="ctr"/>
+            <a:lstStyle/>
+            <a:p>
+              <a:pPr algn="ctr"/>
+              <a:r>
+                <a:rPr lang="es-MX" dirty="0" err="1" smtClean="0"/>
+                <a:t>CLASSModelerEJB</a:t>
+              </a:r>
+              <a:endParaRPr lang="es-CO" dirty="0"/>
+            </a:p>
+          </p:txBody>
+        </p:sp>
+        <p:sp>
+          <p:nvSpPr>
+            <p:cNvPr id="4" name="3 Rectángulo"/>
+            <p:cNvSpPr/>
+            <p:nvPr/>
+          </p:nvSpPr>
+          <p:spPr>
+            <a:xfrm>
+              <a:off x="4572000" y="1509998"/>
+              <a:ext cx="2376264" cy="1130548"/>
+            </a:xfrm>
+            <a:prstGeom prst="rect">
+              <a:avLst/>
+            </a:prstGeom>
+          </p:spPr>
+          <p:style>
+            <a:lnRef idx="1">
+              <a:schemeClr val="accent6"/>
+            </a:lnRef>
+            <a:fillRef idx="2">
+              <a:schemeClr val="accent6"/>
+            </a:fillRef>
+            <a:effectRef idx="1">
+              <a:schemeClr val="accent6"/>
+            </a:effectRef>
+            <a:fontRef idx="minor">
+              <a:schemeClr val="dk1"/>
+            </a:fontRef>
+          </p:style>
+          <p:txBody>
+            <a:bodyPr rtlCol="0" anchor="ctr"/>
+            <a:lstStyle/>
+            <a:p>
+              <a:pPr algn="ctr"/>
+              <a:r>
+                <a:rPr lang="es-MX" dirty="0" err="1" smtClean="0"/>
+                <a:t>CLASSModelerWeb</a:t>
+              </a:r>
+              <a:endParaRPr lang="es-CO" dirty="0"/>
+            </a:p>
+          </p:txBody>
+        </p:sp>
+        <p:sp>
+          <p:nvSpPr>
+            <p:cNvPr id="6" name="5 Rectángulo redondeado"/>
+            <p:cNvSpPr/>
+            <p:nvPr/>
+          </p:nvSpPr>
+          <p:spPr>
+            <a:xfrm>
+              <a:off x="2951820" y="3789040"/>
+              <a:ext cx="2808312" cy="1224136"/>
+            </a:xfrm>
+            <a:prstGeom prst="roundRect">
+              <a:avLst/>
+            </a:prstGeom>
+          </p:spPr>
+          <p:style>
+            <a:lnRef idx="1">
+              <a:schemeClr val="accent3"/>
+            </a:lnRef>
+            <a:fillRef idx="2">
+              <a:schemeClr val="accent3"/>
+            </a:fillRef>
+            <a:effectRef idx="1">
+              <a:schemeClr val="accent3"/>
+            </a:effectRef>
+            <a:fontRef idx="minor">
+              <a:schemeClr val="dk1"/>
+            </a:fontRef>
+          </p:style>
+          <p:txBody>
+            <a:bodyPr rtlCol="0" anchor="ctr"/>
+            <a:lstStyle/>
+            <a:p>
+              <a:pPr algn="ctr"/>
+              <a:r>
+                <a:rPr lang="es-MX" dirty="0" err="1" smtClean="0"/>
+                <a:t>CLASSModelerTest</a:t>
+              </a:r>
+              <a:endParaRPr lang="es-CO" dirty="0"/>
+            </a:p>
+          </p:txBody>
+        </p:sp>
+      </p:grpSp>
     </p:spTree>
     <p:extLst>
       <p:ext uri="{BB962C8B-B14F-4D97-AF65-F5344CB8AC3E}">

</xml_diff>

<commit_message>
Documentation and Code Refactoring
</commit_message>
<xml_diff>
--- a/documentation/CLASS Modeler - Architecture.pptx
+++ b/documentation/CLASS Modeler - Architecture.pptx
@@ -5,13 +5,14 @@
     <p:sldMasterId id="2147483648" r:id="rId1"/>
   </p:sldMasterIdLst>
   <p:notesMasterIdLst>
-    <p:notesMasterId r:id="rId6"/>
+    <p:notesMasterId r:id="rId7"/>
   </p:notesMasterIdLst>
   <p:sldIdLst>
     <p:sldId id="256" r:id="rId2"/>
     <p:sldId id="257" r:id="rId3"/>
     <p:sldId id="258" r:id="rId4"/>
     <p:sldId id="259" r:id="rId5"/>
+    <p:sldId id="260" r:id="rId6"/>
   </p:sldIdLst>
   <p:sldSz cx="9144000" cy="6858000" type="screen4x3"/>
   <p:notesSz cx="6858000" cy="9144000"/>
@@ -195,7 +196,7 @@
           <a:p>
             <a:fld id="{509A3F4F-0BA0-4B22-9A96-AD8854429484}" type="datetimeFigureOut">
               <a:rPr lang="es-CO" smtClean="0"/>
-              <a:t>09/09/2013</a:t>
+              <a:t>10/09/2013</a:t>
             </a:fld>
             <a:endParaRPr lang="es-CO"/>
           </a:p>
@@ -728,7 +729,7 @@
           <a:p>
             <a:fld id="{C9465191-5304-47B4-B0A3-6FBFCBDFE76C}" type="datetimeFigureOut">
               <a:rPr lang="es-CO" smtClean="0"/>
-              <a:t>09/09/2013</a:t>
+              <a:t>10/09/2013</a:t>
             </a:fld>
             <a:endParaRPr lang="es-CO"/>
           </a:p>
@@ -898,7 +899,7 @@
           <a:p>
             <a:fld id="{C9465191-5304-47B4-B0A3-6FBFCBDFE76C}" type="datetimeFigureOut">
               <a:rPr lang="es-CO" smtClean="0"/>
-              <a:t>09/09/2013</a:t>
+              <a:t>10/09/2013</a:t>
             </a:fld>
             <a:endParaRPr lang="es-CO"/>
           </a:p>
@@ -1078,7 +1079,7 @@
           <a:p>
             <a:fld id="{C9465191-5304-47B4-B0A3-6FBFCBDFE76C}" type="datetimeFigureOut">
               <a:rPr lang="es-CO" smtClean="0"/>
-              <a:t>09/09/2013</a:t>
+              <a:t>10/09/2013</a:t>
             </a:fld>
             <a:endParaRPr lang="es-CO"/>
           </a:p>
@@ -1248,7 +1249,7 @@
           <a:p>
             <a:fld id="{C9465191-5304-47B4-B0A3-6FBFCBDFE76C}" type="datetimeFigureOut">
               <a:rPr lang="es-CO" smtClean="0"/>
-              <a:t>09/09/2013</a:t>
+              <a:t>10/09/2013</a:t>
             </a:fld>
             <a:endParaRPr lang="es-CO"/>
           </a:p>
@@ -1494,7 +1495,7 @@
           <a:p>
             <a:fld id="{C9465191-5304-47B4-B0A3-6FBFCBDFE76C}" type="datetimeFigureOut">
               <a:rPr lang="es-CO" smtClean="0"/>
-              <a:t>09/09/2013</a:t>
+              <a:t>10/09/2013</a:t>
             </a:fld>
             <a:endParaRPr lang="es-CO"/>
           </a:p>
@@ -1782,7 +1783,7 @@
           <a:p>
             <a:fld id="{C9465191-5304-47B4-B0A3-6FBFCBDFE76C}" type="datetimeFigureOut">
               <a:rPr lang="es-CO" smtClean="0"/>
-              <a:t>09/09/2013</a:t>
+              <a:t>10/09/2013</a:t>
             </a:fld>
             <a:endParaRPr lang="es-CO"/>
           </a:p>
@@ -2204,7 +2205,7 @@
           <a:p>
             <a:fld id="{C9465191-5304-47B4-B0A3-6FBFCBDFE76C}" type="datetimeFigureOut">
               <a:rPr lang="es-CO" smtClean="0"/>
-              <a:t>09/09/2013</a:t>
+              <a:t>10/09/2013</a:t>
             </a:fld>
             <a:endParaRPr lang="es-CO"/>
           </a:p>
@@ -2322,7 +2323,7 @@
           <a:p>
             <a:fld id="{C9465191-5304-47B4-B0A3-6FBFCBDFE76C}" type="datetimeFigureOut">
               <a:rPr lang="es-CO" smtClean="0"/>
-              <a:t>09/09/2013</a:t>
+              <a:t>10/09/2013</a:t>
             </a:fld>
             <a:endParaRPr lang="es-CO"/>
           </a:p>
@@ -2417,7 +2418,7 @@
           <a:p>
             <a:fld id="{C9465191-5304-47B4-B0A3-6FBFCBDFE76C}" type="datetimeFigureOut">
               <a:rPr lang="es-CO" smtClean="0"/>
-              <a:t>09/09/2013</a:t>
+              <a:t>10/09/2013</a:t>
             </a:fld>
             <a:endParaRPr lang="es-CO"/>
           </a:p>
@@ -2694,7 +2695,7 @@
           <a:p>
             <a:fld id="{C9465191-5304-47B4-B0A3-6FBFCBDFE76C}" type="datetimeFigureOut">
               <a:rPr lang="es-CO" smtClean="0"/>
-              <a:t>09/09/2013</a:t>
+              <a:t>10/09/2013</a:t>
             </a:fld>
             <a:endParaRPr lang="es-CO"/>
           </a:p>
@@ -2947,7 +2948,7 @@
           <a:p>
             <a:fld id="{C9465191-5304-47B4-B0A3-6FBFCBDFE76C}" type="datetimeFigureOut">
               <a:rPr lang="es-CO" smtClean="0"/>
-              <a:t>09/09/2013</a:t>
+              <a:t>10/09/2013</a:t>
             </a:fld>
             <a:endParaRPr lang="es-CO"/>
           </a:p>
@@ -3160,7 +3161,7 @@
           <a:p>
             <a:fld id="{C9465191-5304-47B4-B0A3-6FBFCBDFE76C}" type="datetimeFigureOut">
               <a:rPr lang="es-CO" smtClean="0"/>
-              <a:t>09/09/2013</a:t>
+              <a:t>10/09/2013</a:t>
             </a:fld>
             <a:endParaRPr lang="es-CO"/>
           </a:p>
@@ -6889,6 +6890,340 @@
 </p:sld>
 </file>
 
+<file path=ppt/slides/slide5.xml><?xml version="1.0" encoding="utf-8"?>
+<p:sld xmlns:a="http://schemas.openxmlformats.org/drawingml/2006/main" xmlns:r="http://schemas.openxmlformats.org/officeDocument/2006/relationships" xmlns:p="http://schemas.openxmlformats.org/presentationml/2006/main">
+  <p:cSld>
+    <p:spTree>
+      <p:nvGrpSpPr>
+        <p:cNvPr id="1" name=""/>
+        <p:cNvGrpSpPr/>
+        <p:nvPr/>
+      </p:nvGrpSpPr>
+      <p:grpSpPr>
+        <a:xfrm>
+          <a:off x="0" y="0"/>
+          <a:ext cx="0" cy="0"/>
+          <a:chOff x="0" y="0"/>
+          <a:chExt cx="0" cy="0"/>
+        </a:xfrm>
+      </p:grpSpPr>
+      <p:sp>
+        <p:nvSpPr>
+          <p:cNvPr id="4" name="3 Cilindro"/>
+          <p:cNvSpPr/>
+          <p:nvPr/>
+        </p:nvSpPr>
+        <p:spPr>
+          <a:xfrm>
+            <a:off x="1835696" y="2924944"/>
+            <a:ext cx="1224136" cy="877496"/>
+          </a:xfrm>
+          <a:prstGeom prst="can">
+            <a:avLst/>
+          </a:prstGeom>
+        </p:spPr>
+        <p:style>
+          <a:lnRef idx="1">
+            <a:schemeClr val="accent1"/>
+          </a:lnRef>
+          <a:fillRef idx="2">
+            <a:schemeClr val="accent1"/>
+          </a:fillRef>
+          <a:effectRef idx="1">
+            <a:schemeClr val="accent1"/>
+          </a:effectRef>
+          <a:fontRef idx="minor">
+            <a:schemeClr val="dk1"/>
+          </a:fontRef>
+        </p:style>
+        <p:txBody>
+          <a:bodyPr rtlCol="0" anchor="ctr"/>
+          <a:lstStyle/>
+          <a:p>
+            <a:pPr algn="ctr"/>
+            <a:r>
+              <a:rPr lang="es-CO" dirty="0" smtClean="0"/>
+              <a:t>MySQL</a:t>
+            </a:r>
+            <a:endParaRPr lang="es-CO" dirty="0"/>
+          </a:p>
+        </p:txBody>
+      </p:sp>
+      <p:sp>
+        <p:nvSpPr>
+          <p:cNvPr id="5" name="4 Flecha izquierda y derecha"/>
+          <p:cNvSpPr/>
+          <p:nvPr/>
+        </p:nvSpPr>
+        <p:spPr>
+          <a:xfrm>
+            <a:off x="3203848" y="3280420"/>
+            <a:ext cx="432048" cy="216024"/>
+          </a:xfrm>
+          <a:prstGeom prst="leftRightArrow">
+            <a:avLst/>
+          </a:prstGeom>
+        </p:spPr>
+        <p:style>
+          <a:lnRef idx="1">
+            <a:schemeClr val="accent2"/>
+          </a:lnRef>
+          <a:fillRef idx="2">
+            <a:schemeClr val="accent2"/>
+          </a:fillRef>
+          <a:effectRef idx="1">
+            <a:schemeClr val="accent2"/>
+          </a:effectRef>
+          <a:fontRef idx="minor">
+            <a:schemeClr val="dk1"/>
+          </a:fontRef>
+        </p:style>
+        <p:txBody>
+          <a:bodyPr rtlCol="0" anchor="ctr"/>
+          <a:lstStyle/>
+          <a:p>
+            <a:pPr algn="ctr"/>
+            <a:endParaRPr lang="es-CO"/>
+          </a:p>
+        </p:txBody>
+      </p:sp>
+      <p:pic>
+        <p:nvPicPr>
+          <p:cNvPr id="1027" name="Picture 3"/>
+          <p:cNvPicPr>
+            <a:picLocks noChangeAspect="1" noChangeArrowheads="1"/>
+          </p:cNvPicPr>
+          <p:nvPr/>
+        </p:nvPicPr>
+        <p:blipFill rotWithShape="1">
+          <a:blip r:embed="rId2">
+            <a:extLst>
+              <a:ext uri="{28A0092B-C50C-407E-A947-70E740481C1C}">
+                <a14:useLocalDpi xmlns:a14="http://schemas.microsoft.com/office/drawing/2010/main" val="0"/>
+              </a:ext>
+            </a:extLst>
+          </a:blip>
+          <a:srcRect l="6675" t="13217" r="6515" b="8118"/>
+          <a:stretch/>
+        </p:blipFill>
+        <p:spPr bwMode="auto">
+          <a:xfrm>
+            <a:off x="5155152" y="2344432"/>
+            <a:ext cx="2628360" cy="1881104"/>
+          </a:xfrm>
+          <a:prstGeom prst="rect">
+            <a:avLst/>
+          </a:prstGeom>
+          <a:noFill/>
+          <a:ln>
+            <a:noFill/>
+          </a:ln>
+          <a:effectLst/>
+          <a:extLst>
+            <a:ext uri="{909E8E84-426E-40DD-AFC4-6F175D3DCCD1}">
+              <a14:hiddenFill xmlns:a14="http://schemas.microsoft.com/office/drawing/2010/main">
+                <a:solidFill>
+                  <a:schemeClr val="accent1"/>
+                </a:solidFill>
+              </a14:hiddenFill>
+            </a:ext>
+            <a:ext uri="{91240B29-F687-4F45-9708-019B960494DF}">
+              <a14:hiddenLine xmlns:a14="http://schemas.microsoft.com/office/drawing/2010/main" w="9525">
+                <a:solidFill>
+                  <a:schemeClr val="tx1"/>
+                </a:solidFill>
+                <a:miter lim="800000"/>
+                <a:headEnd/>
+                <a:tailEnd/>
+              </a14:hiddenLine>
+            </a:ext>
+            <a:ext uri="{AF507438-7753-43E0-B8FC-AC1667EBCBE1}">
+              <a14:hiddenEffects xmlns:a14="http://schemas.microsoft.com/office/drawing/2010/main">
+                <a:effectLst>
+                  <a:outerShdw dist="35921" dir="2700000" algn="ctr" rotWithShape="0">
+                    <a:schemeClr val="bg2"/>
+                  </a:outerShdw>
+                </a:effectLst>
+              </a14:hiddenEffects>
+            </a:ext>
+          </a:extLst>
+        </p:spPr>
+      </p:pic>
+      <p:pic>
+        <p:nvPicPr>
+          <p:cNvPr id="1028" name="Picture 4"/>
+          <p:cNvPicPr>
+            <a:picLocks noChangeAspect="1" noChangeArrowheads="1"/>
+          </p:cNvPicPr>
+          <p:nvPr/>
+        </p:nvPicPr>
+        <p:blipFill rotWithShape="1">
+          <a:blip r:embed="rId3">
+            <a:extLst>
+              <a:ext uri="{28A0092B-C50C-407E-A947-70E740481C1C}">
+                <a14:useLocalDpi xmlns:a14="http://schemas.microsoft.com/office/drawing/2010/main" val="0"/>
+              </a:ext>
+            </a:extLst>
+          </a:blip>
+          <a:srcRect l="14167" t="25594" r="12606" b="17709"/>
+          <a:stretch/>
+        </p:blipFill>
+        <p:spPr bwMode="auto">
+          <a:xfrm>
+            <a:off x="5312782" y="2774938"/>
+            <a:ext cx="1347450" cy="1158118"/>
+          </a:xfrm>
+          <a:prstGeom prst="rect">
+            <a:avLst/>
+          </a:prstGeom>
+          <a:noFill/>
+          <a:ln>
+            <a:noFill/>
+          </a:ln>
+          <a:effectLst/>
+          <a:extLst>
+            <a:ext uri="{909E8E84-426E-40DD-AFC4-6F175D3DCCD1}">
+              <a14:hiddenFill xmlns:a14="http://schemas.microsoft.com/office/drawing/2010/main">
+                <a:solidFill>
+                  <a:schemeClr val="accent1"/>
+                </a:solidFill>
+              </a14:hiddenFill>
+            </a:ext>
+            <a:ext uri="{91240B29-F687-4F45-9708-019B960494DF}">
+              <a14:hiddenLine xmlns:a14="http://schemas.microsoft.com/office/drawing/2010/main" w="9525">
+                <a:solidFill>
+                  <a:schemeClr val="tx1"/>
+                </a:solidFill>
+                <a:miter lim="800000"/>
+                <a:headEnd/>
+                <a:tailEnd/>
+              </a14:hiddenLine>
+            </a:ext>
+            <a:ext uri="{AF507438-7753-43E0-B8FC-AC1667EBCBE1}">
+              <a14:hiddenEffects xmlns:a14="http://schemas.microsoft.com/office/drawing/2010/main">
+                <a:effectLst>
+                  <a:outerShdw dist="35921" dir="2700000" algn="ctr" rotWithShape="0">
+                    <a:schemeClr val="bg2"/>
+                  </a:outerShdw>
+                </a:effectLst>
+              </a14:hiddenEffects>
+            </a:ext>
+          </a:extLst>
+        </p:spPr>
+      </p:pic>
+      <p:pic>
+        <p:nvPicPr>
+          <p:cNvPr id="1026" name="Picture 2"/>
+          <p:cNvPicPr>
+            <a:picLocks noChangeAspect="1" noChangeArrowheads="1"/>
+          </p:cNvPicPr>
+          <p:nvPr/>
+        </p:nvPicPr>
+        <p:blipFill rotWithShape="1">
+          <a:blip r:embed="rId4">
+            <a:extLst>
+              <a:ext uri="{28A0092B-C50C-407E-A947-70E740481C1C}">
+                <a14:useLocalDpi xmlns:a14="http://schemas.microsoft.com/office/drawing/2010/main" val="0"/>
+              </a:ext>
+            </a:extLst>
+          </a:blip>
+          <a:srcRect l="11816" t="24410" r="12593" b="15747"/>
+          <a:stretch/>
+        </p:blipFill>
+        <p:spPr bwMode="auto">
+          <a:xfrm>
+            <a:off x="3707904" y="3046432"/>
+            <a:ext cx="1152000" cy="684000"/>
+          </a:xfrm>
+          <a:prstGeom prst="rect">
+            <a:avLst/>
+          </a:prstGeom>
+          <a:noFill/>
+          <a:ln>
+            <a:noFill/>
+          </a:ln>
+          <a:effectLst/>
+          <a:extLst>
+            <a:ext uri="{909E8E84-426E-40DD-AFC4-6F175D3DCCD1}">
+              <a14:hiddenFill xmlns:a14="http://schemas.microsoft.com/office/drawing/2010/main">
+                <a:solidFill>
+                  <a:schemeClr val="accent1"/>
+                </a:solidFill>
+              </a14:hiddenFill>
+            </a:ext>
+            <a:ext uri="{91240B29-F687-4F45-9708-019B960494DF}">
+              <a14:hiddenLine xmlns:a14="http://schemas.microsoft.com/office/drawing/2010/main" w="9525">
+                <a:solidFill>
+                  <a:schemeClr val="tx1"/>
+                </a:solidFill>
+                <a:miter lim="800000"/>
+                <a:headEnd/>
+                <a:tailEnd/>
+              </a14:hiddenLine>
+            </a:ext>
+            <a:ext uri="{AF507438-7753-43E0-B8FC-AC1667EBCBE1}">
+              <a14:hiddenEffects xmlns:a14="http://schemas.microsoft.com/office/drawing/2010/main">
+                <a:effectLst>
+                  <a:outerShdw dist="35921" dir="2700000" algn="ctr" rotWithShape="0">
+                    <a:schemeClr val="bg2"/>
+                  </a:outerShdw>
+                </a:effectLst>
+              </a14:hiddenEffects>
+            </a:ext>
+          </a:extLst>
+        </p:spPr>
+      </p:pic>
+      <p:sp>
+        <p:nvSpPr>
+          <p:cNvPr id="9" name="8 Flecha izquierda y derecha"/>
+          <p:cNvSpPr/>
+          <p:nvPr/>
+        </p:nvSpPr>
+        <p:spPr>
+          <a:xfrm>
+            <a:off x="4859904" y="3255680"/>
+            <a:ext cx="432048" cy="216024"/>
+          </a:xfrm>
+          <a:prstGeom prst="leftRightArrow">
+            <a:avLst/>
+          </a:prstGeom>
+        </p:spPr>
+        <p:style>
+          <a:lnRef idx="1">
+            <a:schemeClr val="accent2"/>
+          </a:lnRef>
+          <a:fillRef idx="2">
+            <a:schemeClr val="accent2"/>
+          </a:fillRef>
+          <a:effectRef idx="1">
+            <a:schemeClr val="accent2"/>
+          </a:effectRef>
+          <a:fontRef idx="minor">
+            <a:schemeClr val="dk1"/>
+          </a:fontRef>
+        </p:style>
+        <p:txBody>
+          <a:bodyPr rtlCol="0" anchor="ctr"/>
+          <a:lstStyle/>
+          <a:p>
+            <a:pPr algn="ctr"/>
+            <a:endParaRPr lang="es-CO"/>
+          </a:p>
+        </p:txBody>
+      </p:sp>
+    </p:spTree>
+    <p:extLst>
+      <p:ext uri="{BB962C8B-B14F-4D97-AF65-F5344CB8AC3E}">
+        <p14:creationId xmlns:p14="http://schemas.microsoft.com/office/powerpoint/2010/main" val="2701487075"/>
+      </p:ext>
+    </p:extLst>
+  </p:cSld>
+  <p:clrMapOvr>
+    <a:masterClrMapping/>
+  </p:clrMapOvr>
+</p:sld>
+</file>
+
 <file path=ppt/theme/theme1.xml><?xml version="1.0" encoding="utf-8"?>
 <a:theme xmlns:a="http://schemas.openxmlformats.org/drawingml/2006/main" name="Tema de Office">
   <a:themeElements>

</xml_diff>